<commit_message>
Added Lab and updated README
</commit_message>
<xml_diff>
--- a/Lectures/CITS5503Networking.pptx
+++ b/Lectures/CITS5503Networking.pptx
@@ -5,10 +5,10 @@
     <p:sldMasterId id="2147483694" r:id="rId1"/>
   </p:sldMasterIdLst>
   <p:notesMasterIdLst>
-    <p:notesMasterId r:id="rId23"/>
+    <p:notesMasterId r:id="rId26"/>
   </p:notesMasterIdLst>
   <p:handoutMasterIdLst>
-    <p:handoutMasterId r:id="rId24"/>
+    <p:handoutMasterId r:id="rId27"/>
   </p:handoutMasterIdLst>
   <p:sldIdLst>
     <p:sldId id="1373" r:id="rId2"/>
@@ -20,18 +20,21 @@
     <p:sldId id="1305" r:id="rId8"/>
     <p:sldId id="898" r:id="rId9"/>
     <p:sldId id="1361" r:id="rId10"/>
-    <p:sldId id="900" r:id="rId11"/>
-    <p:sldId id="1362" r:id="rId12"/>
-    <p:sldId id="1363" r:id="rId13"/>
-    <p:sldId id="1364" r:id="rId14"/>
-    <p:sldId id="1365" r:id="rId15"/>
-    <p:sldId id="1366" r:id="rId16"/>
-    <p:sldId id="1367" r:id="rId17"/>
-    <p:sldId id="1368" r:id="rId18"/>
-    <p:sldId id="1369" r:id="rId19"/>
-    <p:sldId id="1370" r:id="rId20"/>
-    <p:sldId id="1371" r:id="rId21"/>
-    <p:sldId id="1372" r:id="rId22"/>
+    <p:sldId id="1374" r:id="rId11"/>
+    <p:sldId id="1375" r:id="rId12"/>
+    <p:sldId id="900" r:id="rId13"/>
+    <p:sldId id="1362" r:id="rId14"/>
+    <p:sldId id="1363" r:id="rId15"/>
+    <p:sldId id="1376" r:id="rId16"/>
+    <p:sldId id="1364" r:id="rId17"/>
+    <p:sldId id="1365" r:id="rId18"/>
+    <p:sldId id="1366" r:id="rId19"/>
+    <p:sldId id="1367" r:id="rId20"/>
+    <p:sldId id="1368" r:id="rId21"/>
+    <p:sldId id="1369" r:id="rId22"/>
+    <p:sldId id="1370" r:id="rId23"/>
+    <p:sldId id="1371" r:id="rId24"/>
+    <p:sldId id="1372" r:id="rId25"/>
   </p:sldIdLst>
   <p:sldSz cx="12192000" cy="6858000"/>
   <p:notesSz cx="9601200" cy="7315200"/>
@@ -1579,7 +1582,7 @@
             <a:fld id="{B61BEF0D-F0BB-DE4B-95CE-6DB70DBA9567}" type="datetimeFigureOut">
               <a:rPr lang="en-US" smtClean="0"/>
               <a:pPr/>
-              <a:t>4/9/18</a:t>
+              <a:t>4/21/18</a:t>
             </a:fld>
             <a:endParaRPr lang="en-US" dirty="0"/>
           </a:p>
@@ -1779,7 +1782,7 @@
             <a:fld id="{B61BEF0D-F0BB-DE4B-95CE-6DB70DBA9567}" type="datetimeFigureOut">
               <a:rPr lang="en-US" smtClean="0"/>
               <a:pPr/>
-              <a:t>4/9/18</a:t>
+              <a:t>4/21/18</a:t>
             </a:fld>
             <a:endParaRPr lang="en-US" dirty="0"/>
           </a:p>
@@ -1994,7 +1997,7 @@
             <a:fld id="{B61BEF0D-F0BB-DE4B-95CE-6DB70DBA9567}" type="datetimeFigureOut">
               <a:rPr lang="en-US" smtClean="0"/>
               <a:pPr/>
-              <a:t>4/9/18</a:t>
+              <a:t>4/21/18</a:t>
             </a:fld>
             <a:endParaRPr lang="en-US" dirty="0"/>
           </a:p>
@@ -2534,7 +2537,7 @@
             <a:fld id="{B61BEF0D-F0BB-DE4B-95CE-6DB70DBA9567}" type="datetimeFigureOut">
               <a:rPr lang="en-US" smtClean="0"/>
               <a:pPr/>
-              <a:t>4/9/18</a:t>
+              <a:t>4/21/18</a:t>
             </a:fld>
             <a:endParaRPr lang="en-US" dirty="0"/>
           </a:p>
@@ -2812,7 +2815,7 @@
             <a:fld id="{B61BEF0D-F0BB-DE4B-95CE-6DB70DBA9567}" type="datetimeFigureOut">
               <a:rPr lang="en-US" smtClean="0"/>
               <a:pPr/>
-              <a:t>4/9/18</a:t>
+              <a:t>4/21/18</a:t>
             </a:fld>
             <a:endParaRPr lang="en-US" dirty="0"/>
           </a:p>
@@ -3084,7 +3087,7 @@
             <a:fld id="{B61BEF0D-F0BB-DE4B-95CE-6DB70DBA9567}" type="datetimeFigureOut">
               <a:rPr lang="en-US" smtClean="0"/>
               <a:pPr/>
-              <a:t>4/9/18</a:t>
+              <a:t>4/21/18</a:t>
             </a:fld>
             <a:endParaRPr lang="en-US" dirty="0"/>
           </a:p>
@@ -3503,7 +3506,7 @@
             <a:fld id="{B61BEF0D-F0BB-DE4B-95CE-6DB70DBA9567}" type="datetimeFigureOut">
               <a:rPr lang="en-US" smtClean="0"/>
               <a:pPr/>
-              <a:t>4/9/18</a:t>
+              <a:t>4/21/18</a:t>
             </a:fld>
             <a:endParaRPr lang="en-US" dirty="0"/>
           </a:p>
@@ -3651,7 +3654,7 @@
             <a:fld id="{B61BEF0D-F0BB-DE4B-95CE-6DB70DBA9567}" type="datetimeFigureOut">
               <a:rPr lang="en-US" smtClean="0"/>
               <a:pPr/>
-              <a:t>4/9/18</a:t>
+              <a:t>4/21/18</a:t>
             </a:fld>
             <a:endParaRPr lang="en-US" dirty="0"/>
           </a:p>
@@ -3771,7 +3774,7 @@
             <a:fld id="{B61BEF0D-F0BB-DE4B-95CE-6DB70DBA9567}" type="datetimeFigureOut">
               <a:rPr lang="en-US" smtClean="0"/>
               <a:pPr/>
-              <a:t>4/9/18</a:t>
+              <a:t>4/21/18</a:t>
             </a:fld>
             <a:endParaRPr lang="en-US" dirty="0"/>
           </a:p>
@@ -4089,7 +4092,7 @@
             <a:fld id="{B61BEF0D-F0BB-DE4B-95CE-6DB70DBA9567}" type="datetimeFigureOut">
               <a:rPr lang="en-US" smtClean="0"/>
               <a:pPr/>
-              <a:t>4/9/18</a:t>
+              <a:t>4/21/18</a:t>
             </a:fld>
             <a:endParaRPr lang="en-US" dirty="0"/>
           </a:p>
@@ -4384,7 +4387,7 @@
             <a:fld id="{B61BEF0D-F0BB-DE4B-95CE-6DB70DBA9567}" type="datetimeFigureOut">
               <a:rPr lang="en-US" smtClean="0"/>
               <a:pPr/>
-              <a:t>4/9/18</a:t>
+              <a:t>4/21/18</a:t>
             </a:fld>
             <a:endParaRPr lang="en-US" dirty="0"/>
           </a:p>
@@ -4632,7 +4635,7 @@
             <a:fld id="{B61BEF0D-F0BB-DE4B-95CE-6DB70DBA9567}" type="datetimeFigureOut">
               <a:rPr lang="en-US" smtClean="0"/>
               <a:pPr/>
-              <a:t>4/9/18</a:t>
+              <a:t>4/21/18</a:t>
             </a:fld>
             <a:endParaRPr lang="en-US" dirty="0"/>
           </a:p>
@@ -5411,7 +5414,7 @@
                 </a:solidFill>
               </a:rPr>
               <a:pPr/>
-              <a:t>2</a:t>
+              <a:t>1</a:t>
             </a:fld>
             <a:endParaRPr lang="en-GB">
               <a:solidFill>
@@ -5435,6 +5438,376 @@
 </file>
 
 <file path=ppt/slides/slide10.xml><?xml version="1.0" encoding="utf-8"?>
+<p:sld xmlns:a="http://schemas.openxmlformats.org/drawingml/2006/main" xmlns:r="http://schemas.openxmlformats.org/officeDocument/2006/relationships" xmlns:p="http://schemas.openxmlformats.org/presentationml/2006/main">
+  <p:cSld>
+    <p:spTree>
+      <p:nvGrpSpPr>
+        <p:cNvPr id="1" name=""/>
+        <p:cNvGrpSpPr/>
+        <p:nvPr/>
+      </p:nvGrpSpPr>
+      <p:grpSpPr>
+        <a:xfrm>
+          <a:off x="0" y="0"/>
+          <a:ext cx="0" cy="0"/>
+          <a:chOff x="0" y="0"/>
+          <a:chExt cx="0" cy="0"/>
+        </a:xfrm>
+      </p:grpSpPr>
+      <p:sp>
+        <p:nvSpPr>
+          <p:cNvPr id="2" name="Title 1">
+            <a:extLst>
+              <a:ext uri="{FF2B5EF4-FFF2-40B4-BE49-F238E27FC236}">
+                <a16:creationId xmlns:a16="http://schemas.microsoft.com/office/drawing/2014/main" id="{8A94DD00-3E89-8B4B-8936-0AF2D65B0624}"/>
+              </a:ext>
+            </a:extLst>
+          </p:cNvPr>
+          <p:cNvSpPr>
+            <a:spLocks noGrp="1"/>
+          </p:cNvSpPr>
+          <p:nvPr>
+            <p:ph type="title"/>
+          </p:nvPr>
+        </p:nvSpPr>
+        <p:spPr/>
+        <p:txBody>
+          <a:bodyPr/>
+          <a:lstStyle/>
+          <a:p>
+            <a:r>
+              <a:rPr lang="en-US" dirty="0"/>
+              <a:t>TCP/UDP Ports</a:t>
+            </a:r>
+          </a:p>
+        </p:txBody>
+      </p:sp>
+      <p:sp>
+        <p:nvSpPr>
+          <p:cNvPr id="3" name="Content Placeholder 2">
+            <a:extLst>
+              <a:ext uri="{FF2B5EF4-FFF2-40B4-BE49-F238E27FC236}">
+                <a16:creationId xmlns:a16="http://schemas.microsoft.com/office/drawing/2014/main" id="{B39D6D26-E36C-BA42-A291-C24C109CDB0C}"/>
+              </a:ext>
+            </a:extLst>
+          </p:cNvPr>
+          <p:cNvSpPr>
+            <a:spLocks noGrp="1"/>
+          </p:cNvSpPr>
+          <p:nvPr>
+            <p:ph idx="1"/>
+          </p:nvPr>
+        </p:nvSpPr>
+        <p:spPr/>
+        <p:txBody>
+          <a:bodyPr/>
+          <a:lstStyle/>
+          <a:p>
+            <a:r>
+              <a:rPr lang="en-US" dirty="0"/>
+              <a:t>IPv4 or IPv6 addresses will get a network packet to a machine but machine needs to know what application to pass this to</a:t>
+            </a:r>
+          </a:p>
+          <a:p>
+            <a:r>
+              <a:rPr lang="en-US" dirty="0"/>
+              <a:t>Ports are used for this</a:t>
+            </a:r>
+          </a:p>
+          <a:p>
+            <a:pPr lvl="1"/>
+            <a:r>
+              <a:rPr lang="en-US" dirty="0"/>
+              <a:t>TCP and UDP have 65,534 ports each</a:t>
+            </a:r>
+          </a:p>
+          <a:p>
+            <a:pPr lvl="1"/>
+            <a:r>
+              <a:rPr lang="en-US" dirty="0"/>
+              <a:t>Ports (0 – 1,023) are system ports</a:t>
+            </a:r>
+          </a:p>
+          <a:p>
+            <a:pPr lvl="1"/>
+            <a:r>
+              <a:rPr lang="en-US" dirty="0"/>
+              <a:t>Ports (1,024 – 49,151) are user ports</a:t>
+            </a:r>
+          </a:p>
+          <a:p>
+            <a:pPr lvl="1"/>
+            <a:r>
+              <a:rPr lang="en-US" dirty="0"/>
+              <a:t>Ports (49,152 – 65,535) are dynamic and/or private ports</a:t>
+            </a:r>
+          </a:p>
+          <a:p>
+            <a:pPr lvl="1"/>
+            <a:r>
+              <a:rPr lang="en-US" dirty="0"/>
+              <a:t>Defined in Service Name and Transport Protocol Port Number Registry (https://</a:t>
+            </a:r>
+            <a:r>
+              <a:rPr lang="en-US" dirty="0" err="1"/>
+              <a:t>www.iana.org</a:t>
+            </a:r>
+            <a:r>
+              <a:rPr lang="en-US" dirty="0"/>
+              <a:t>/assignments/service-names-port-numbers/service-names-port-</a:t>
+            </a:r>
+            <a:r>
+              <a:rPr lang="en-US" dirty="0" err="1"/>
+              <a:t>numbers.xhtml</a:t>
+            </a:r>
+            <a:r>
+              <a:rPr lang="en-US" dirty="0"/>
+              <a:t>)</a:t>
+            </a:r>
+          </a:p>
+        </p:txBody>
+      </p:sp>
+      <p:sp>
+        <p:nvSpPr>
+          <p:cNvPr id="4" name="Footer Placeholder 3">
+            <a:extLst>
+              <a:ext uri="{FF2B5EF4-FFF2-40B4-BE49-F238E27FC236}">
+                <a16:creationId xmlns:a16="http://schemas.microsoft.com/office/drawing/2014/main" id="{63D583B2-F1B4-E64E-8C74-1650C616FB74}"/>
+              </a:ext>
+            </a:extLst>
+          </p:cNvPr>
+          <p:cNvSpPr>
+            <a:spLocks noGrp="1"/>
+          </p:cNvSpPr>
+          <p:nvPr>
+            <p:ph type="ftr" sz="quarter" idx="11"/>
+          </p:nvPr>
+        </p:nvSpPr>
+        <p:spPr/>
+        <p:txBody>
+          <a:bodyPr/>
+          <a:lstStyle/>
+          <a:p>
+            <a:endParaRPr lang="en-GB" dirty="0"/>
+          </a:p>
+        </p:txBody>
+      </p:sp>
+      <p:sp>
+        <p:nvSpPr>
+          <p:cNvPr id="5" name="Slide Number Placeholder 4">
+            <a:extLst>
+              <a:ext uri="{FF2B5EF4-FFF2-40B4-BE49-F238E27FC236}">
+                <a16:creationId xmlns:a16="http://schemas.microsoft.com/office/drawing/2014/main" id="{EF62C08F-C341-904B-AE46-43BBD661CEE2}"/>
+              </a:ext>
+            </a:extLst>
+          </p:cNvPr>
+          <p:cNvSpPr>
+            <a:spLocks noGrp="1"/>
+          </p:cNvSpPr>
+          <p:nvPr>
+            <p:ph type="sldNum" sz="quarter" idx="12"/>
+          </p:nvPr>
+        </p:nvSpPr>
+        <p:spPr/>
+        <p:txBody>
+          <a:bodyPr/>
+          <a:lstStyle/>
+          <a:p>
+            <a:fld id="{05072F42-4DFA-4725-86F9-7594E4AB4EB5}" type="slidenum">
+              <a:rPr lang="en-GB" smtClean="0"/>
+              <a:pPr/>
+              <a:t>10</a:t>
+            </a:fld>
+            <a:endParaRPr lang="en-GB"/>
+          </a:p>
+        </p:txBody>
+      </p:sp>
+    </p:spTree>
+    <p:extLst>
+      <p:ext uri="{BB962C8B-B14F-4D97-AF65-F5344CB8AC3E}">
+        <p14:creationId xmlns:p14="http://schemas.microsoft.com/office/powerpoint/2010/main" val="2719663066"/>
+      </p:ext>
+    </p:extLst>
+  </p:cSld>
+  <p:clrMapOvr>
+    <a:masterClrMapping/>
+  </p:clrMapOvr>
+</p:sld>
+</file>
+
+<file path=ppt/slides/slide11.xml><?xml version="1.0" encoding="utf-8"?>
+<p:sld xmlns:a="http://schemas.openxmlformats.org/drawingml/2006/main" xmlns:r="http://schemas.openxmlformats.org/officeDocument/2006/relationships" xmlns:p="http://schemas.openxmlformats.org/presentationml/2006/main">
+  <p:cSld>
+    <p:spTree>
+      <p:nvGrpSpPr>
+        <p:cNvPr id="1" name=""/>
+        <p:cNvGrpSpPr/>
+        <p:nvPr/>
+      </p:nvGrpSpPr>
+      <p:grpSpPr>
+        <a:xfrm>
+          <a:off x="0" y="0"/>
+          <a:ext cx="0" cy="0"/>
+          <a:chOff x="0" y="0"/>
+          <a:chExt cx="0" cy="0"/>
+        </a:xfrm>
+      </p:grpSpPr>
+      <p:sp>
+        <p:nvSpPr>
+          <p:cNvPr id="2" name="Title 1">
+            <a:extLst>
+              <a:ext uri="{FF2B5EF4-FFF2-40B4-BE49-F238E27FC236}">
+                <a16:creationId xmlns:a16="http://schemas.microsoft.com/office/drawing/2014/main" id="{8A94DD00-3E89-8B4B-8936-0AF2D65B0624}"/>
+              </a:ext>
+            </a:extLst>
+          </p:cNvPr>
+          <p:cNvSpPr>
+            <a:spLocks noGrp="1"/>
+          </p:cNvSpPr>
+          <p:nvPr>
+            <p:ph type="title"/>
+          </p:nvPr>
+        </p:nvSpPr>
+        <p:spPr/>
+        <p:txBody>
+          <a:bodyPr/>
+          <a:lstStyle/>
+          <a:p>
+            <a:r>
+              <a:rPr lang="en-US" dirty="0"/>
+              <a:t>Well known ports</a:t>
+            </a:r>
+          </a:p>
+        </p:txBody>
+      </p:sp>
+      <p:sp>
+        <p:nvSpPr>
+          <p:cNvPr id="3" name="Content Placeholder 2">
+            <a:extLst>
+              <a:ext uri="{FF2B5EF4-FFF2-40B4-BE49-F238E27FC236}">
+                <a16:creationId xmlns:a16="http://schemas.microsoft.com/office/drawing/2014/main" id="{B39D6D26-E36C-BA42-A291-C24C109CDB0C}"/>
+              </a:ext>
+            </a:extLst>
+          </p:cNvPr>
+          <p:cNvSpPr>
+            <a:spLocks noGrp="1"/>
+          </p:cNvSpPr>
+          <p:nvPr>
+            <p:ph idx="1"/>
+          </p:nvPr>
+        </p:nvSpPr>
+        <p:spPr/>
+        <p:txBody>
+          <a:bodyPr/>
+          <a:lstStyle/>
+          <a:p>
+            <a:r>
+              <a:rPr lang="en-US" dirty="0"/>
+              <a:t>Main ones we are interested in:</a:t>
+            </a:r>
+          </a:p>
+          <a:p>
+            <a:pPr lvl="1"/>
+            <a:r>
+              <a:rPr lang="en-US" dirty="0" err="1"/>
+              <a:t>ssh</a:t>
+            </a:r>
+            <a:r>
+              <a:rPr lang="en-US" dirty="0"/>
+              <a:t> TCP/UDP Port 22</a:t>
+            </a:r>
+          </a:p>
+          <a:p>
+            <a:pPr lvl="1"/>
+            <a:r>
+              <a:rPr lang="en-US" dirty="0"/>
+              <a:t>http TCP Port 80</a:t>
+            </a:r>
+          </a:p>
+          <a:p>
+            <a:pPr lvl="1"/>
+            <a:r>
+              <a:rPr lang="en-US" dirty="0"/>
+              <a:t>https TCP Port 443</a:t>
+            </a:r>
+          </a:p>
+          <a:p>
+            <a:r>
+              <a:rPr lang="en-US" dirty="0"/>
+              <a:t>Applications use sockets to listen and receive packets and to send them</a:t>
+            </a:r>
+          </a:p>
+        </p:txBody>
+      </p:sp>
+      <p:sp>
+        <p:nvSpPr>
+          <p:cNvPr id="4" name="Footer Placeholder 3">
+            <a:extLst>
+              <a:ext uri="{FF2B5EF4-FFF2-40B4-BE49-F238E27FC236}">
+                <a16:creationId xmlns:a16="http://schemas.microsoft.com/office/drawing/2014/main" id="{63D583B2-F1B4-E64E-8C74-1650C616FB74}"/>
+              </a:ext>
+            </a:extLst>
+          </p:cNvPr>
+          <p:cNvSpPr>
+            <a:spLocks noGrp="1"/>
+          </p:cNvSpPr>
+          <p:nvPr>
+            <p:ph type="ftr" sz="quarter" idx="11"/>
+          </p:nvPr>
+        </p:nvSpPr>
+        <p:spPr/>
+        <p:txBody>
+          <a:bodyPr/>
+          <a:lstStyle/>
+          <a:p>
+            <a:endParaRPr lang="en-GB" dirty="0"/>
+          </a:p>
+        </p:txBody>
+      </p:sp>
+      <p:sp>
+        <p:nvSpPr>
+          <p:cNvPr id="5" name="Slide Number Placeholder 4">
+            <a:extLst>
+              <a:ext uri="{FF2B5EF4-FFF2-40B4-BE49-F238E27FC236}">
+                <a16:creationId xmlns:a16="http://schemas.microsoft.com/office/drawing/2014/main" id="{EF62C08F-C341-904B-AE46-43BBD661CEE2}"/>
+              </a:ext>
+            </a:extLst>
+          </p:cNvPr>
+          <p:cNvSpPr>
+            <a:spLocks noGrp="1"/>
+          </p:cNvSpPr>
+          <p:nvPr>
+            <p:ph type="sldNum" sz="quarter" idx="12"/>
+          </p:nvPr>
+        </p:nvSpPr>
+        <p:spPr/>
+        <p:txBody>
+          <a:bodyPr/>
+          <a:lstStyle/>
+          <a:p>
+            <a:fld id="{05072F42-4DFA-4725-86F9-7594E4AB4EB5}" type="slidenum">
+              <a:rPr lang="en-GB" smtClean="0"/>
+              <a:pPr/>
+              <a:t>11</a:t>
+            </a:fld>
+            <a:endParaRPr lang="en-GB"/>
+          </a:p>
+        </p:txBody>
+      </p:sp>
+    </p:spTree>
+    <p:extLst>
+      <p:ext uri="{BB962C8B-B14F-4D97-AF65-F5344CB8AC3E}">
+        <p14:creationId xmlns:p14="http://schemas.microsoft.com/office/powerpoint/2010/main" val="1300032655"/>
+      </p:ext>
+    </p:extLst>
+  </p:cSld>
+  <p:clrMapOvr>
+    <a:masterClrMapping/>
+  </p:clrMapOvr>
+</p:sld>
+</file>
+
+<file path=ppt/slides/slide12.xml><?xml version="1.0" encoding="utf-8"?>
 <p:sld xmlns:a="http://schemas.openxmlformats.org/drawingml/2006/main" xmlns:r="http://schemas.openxmlformats.org/officeDocument/2006/relationships" xmlns:p="http://schemas.openxmlformats.org/presentationml/2006/main">
   <p:cSld>
     <p:spTree>
@@ -5784,7 +6157,7 @@
 </p:sld>
 </file>
 
-<file path=ppt/slides/slide11.xml><?xml version="1.0" encoding="utf-8"?>
+<file path=ppt/slides/slide13.xml><?xml version="1.0" encoding="utf-8"?>
 <p:sld xmlns:a="http://schemas.openxmlformats.org/drawingml/2006/main" xmlns:r="http://schemas.openxmlformats.org/officeDocument/2006/relationships" xmlns:p="http://schemas.openxmlformats.org/presentationml/2006/main">
   <p:cSld>
     <p:bg>
@@ -6004,7 +6377,7 @@
                 <a:latin typeface="+mn-lt"/>
               </a:rPr>
               <a:pPr/>
-              <a:t>11</a:t>
+              <a:t>13</a:t>
             </a:fld>
             <a:endParaRPr lang="en-US">
               <a:latin typeface="+mn-lt"/>
@@ -6025,7 +6398,7 @@
 </p:sld>
 </file>
 
-<file path=ppt/slides/slide12.xml><?xml version="1.0" encoding="utf-8"?>
+<file path=ppt/slides/slide14.xml><?xml version="1.0" encoding="utf-8"?>
 <p:sld xmlns:a="http://schemas.openxmlformats.org/drawingml/2006/main" xmlns:r="http://schemas.openxmlformats.org/officeDocument/2006/relationships" xmlns:p="http://schemas.openxmlformats.org/presentationml/2006/main">
   <p:cSld>
     <p:bg>
@@ -6227,7 +6600,7 @@
 </p:sld>
 </file>
 
-<file path=ppt/slides/slide13.xml><?xml version="1.0" encoding="utf-8"?>
+<file path=ppt/slides/slide15.xml><?xml version="1.0" encoding="utf-8"?>
 <p:sld xmlns:a="http://schemas.openxmlformats.org/drawingml/2006/main" xmlns:r="http://schemas.openxmlformats.org/officeDocument/2006/relationships" xmlns:p="http://schemas.openxmlformats.org/presentationml/2006/main">
   <p:cSld>
     <p:spTree>
@@ -6249,6 +6622,179 @@
           <p:cNvPr id="2" name="Title 1">
             <a:extLst>
               <a:ext uri="{FF2B5EF4-FFF2-40B4-BE49-F238E27FC236}">
+                <a16:creationId xmlns:a16="http://schemas.microsoft.com/office/drawing/2014/main" id="{8A94DD00-3E89-8B4B-8936-0AF2D65B0624}"/>
+              </a:ext>
+            </a:extLst>
+          </p:cNvPr>
+          <p:cNvSpPr>
+            <a:spLocks noGrp="1"/>
+          </p:cNvSpPr>
+          <p:nvPr>
+            <p:ph type="title"/>
+          </p:nvPr>
+        </p:nvSpPr>
+        <p:spPr/>
+        <p:txBody>
+          <a:bodyPr/>
+          <a:lstStyle/>
+          <a:p>
+            <a:r>
+              <a:rPr lang="en-US" dirty="0"/>
+              <a:t>Port mapping</a:t>
+            </a:r>
+          </a:p>
+        </p:txBody>
+      </p:sp>
+      <p:sp>
+        <p:nvSpPr>
+          <p:cNvPr id="3" name="Content Placeholder 2">
+            <a:extLst>
+              <a:ext uri="{FF2B5EF4-FFF2-40B4-BE49-F238E27FC236}">
+                <a16:creationId xmlns:a16="http://schemas.microsoft.com/office/drawing/2014/main" id="{B39D6D26-E36C-BA42-A291-C24C109CDB0C}"/>
+              </a:ext>
+            </a:extLst>
+          </p:cNvPr>
+          <p:cNvSpPr>
+            <a:spLocks noGrp="1"/>
+          </p:cNvSpPr>
+          <p:nvPr>
+            <p:ph idx="1"/>
+          </p:nvPr>
+        </p:nvSpPr>
+        <p:spPr/>
+        <p:txBody>
+          <a:bodyPr/>
+          <a:lstStyle/>
+          <a:p>
+            <a:r>
+              <a:rPr lang="en-US" dirty="0"/>
+              <a:t>NAT works by keeping a table of private sender IP addresses and ports that map to a port and IP address on its public interface</a:t>
+            </a:r>
+          </a:p>
+          <a:p>
+            <a:r>
+              <a:rPr lang="en-US" dirty="0"/>
+              <a:t>When the reply comes back from the external IP address, it looks up the table and knows where to send it to</a:t>
+            </a:r>
+          </a:p>
+          <a:p>
+            <a:r>
+              <a:rPr lang="en-US" dirty="0"/>
+              <a:t>For inbound traffic, external ports need to be explicitly mapped to an </a:t>
+            </a:r>
+            <a:r>
+              <a:rPr lang="en-US" dirty="0" err="1"/>
+              <a:t>ip</a:t>
+            </a:r>
+            <a:r>
+              <a:rPr lang="en-US" dirty="0"/>
+              <a:t> address and port on the private network</a:t>
+            </a:r>
+          </a:p>
+          <a:p>
+            <a:pPr lvl="1"/>
+            <a:r>
+              <a:rPr lang="en-US" dirty="0"/>
+              <a:t>They don’t have to be the same port – so 80 externally can map to </a:t>
+            </a:r>
+            <a:r>
+              <a:rPr lang="en-US"/>
+              <a:t>8080 internally</a:t>
+            </a:r>
+            <a:endParaRPr lang="en-US" dirty="0"/>
+          </a:p>
+        </p:txBody>
+      </p:sp>
+      <p:sp>
+        <p:nvSpPr>
+          <p:cNvPr id="4" name="Footer Placeholder 3">
+            <a:extLst>
+              <a:ext uri="{FF2B5EF4-FFF2-40B4-BE49-F238E27FC236}">
+                <a16:creationId xmlns:a16="http://schemas.microsoft.com/office/drawing/2014/main" id="{63D583B2-F1B4-E64E-8C74-1650C616FB74}"/>
+              </a:ext>
+            </a:extLst>
+          </p:cNvPr>
+          <p:cNvSpPr>
+            <a:spLocks noGrp="1"/>
+          </p:cNvSpPr>
+          <p:nvPr>
+            <p:ph type="ftr" sz="quarter" idx="11"/>
+          </p:nvPr>
+        </p:nvSpPr>
+        <p:spPr/>
+        <p:txBody>
+          <a:bodyPr/>
+          <a:lstStyle/>
+          <a:p>
+            <a:endParaRPr lang="en-GB" dirty="0"/>
+          </a:p>
+        </p:txBody>
+      </p:sp>
+      <p:sp>
+        <p:nvSpPr>
+          <p:cNvPr id="5" name="Slide Number Placeholder 4">
+            <a:extLst>
+              <a:ext uri="{FF2B5EF4-FFF2-40B4-BE49-F238E27FC236}">
+                <a16:creationId xmlns:a16="http://schemas.microsoft.com/office/drawing/2014/main" id="{EF62C08F-C341-904B-AE46-43BBD661CEE2}"/>
+              </a:ext>
+            </a:extLst>
+          </p:cNvPr>
+          <p:cNvSpPr>
+            <a:spLocks noGrp="1"/>
+          </p:cNvSpPr>
+          <p:nvPr>
+            <p:ph type="sldNum" sz="quarter" idx="12"/>
+          </p:nvPr>
+        </p:nvSpPr>
+        <p:spPr/>
+        <p:txBody>
+          <a:bodyPr/>
+          <a:lstStyle/>
+          <a:p>
+            <a:fld id="{05072F42-4DFA-4725-86F9-7594E4AB4EB5}" type="slidenum">
+              <a:rPr lang="en-GB" smtClean="0"/>
+              <a:pPr/>
+              <a:t>15</a:t>
+            </a:fld>
+            <a:endParaRPr lang="en-GB"/>
+          </a:p>
+        </p:txBody>
+      </p:sp>
+    </p:spTree>
+    <p:extLst>
+      <p:ext uri="{BB962C8B-B14F-4D97-AF65-F5344CB8AC3E}">
+        <p14:creationId xmlns:p14="http://schemas.microsoft.com/office/powerpoint/2010/main" val="3865226453"/>
+      </p:ext>
+    </p:extLst>
+  </p:cSld>
+  <p:clrMapOvr>
+    <a:masterClrMapping/>
+  </p:clrMapOvr>
+</p:sld>
+</file>
+
+<file path=ppt/slides/slide16.xml><?xml version="1.0" encoding="utf-8"?>
+<p:sld xmlns:a="http://schemas.openxmlformats.org/drawingml/2006/main" xmlns:r="http://schemas.openxmlformats.org/officeDocument/2006/relationships" xmlns:p="http://schemas.openxmlformats.org/presentationml/2006/main">
+  <p:cSld>
+    <p:spTree>
+      <p:nvGrpSpPr>
+        <p:cNvPr id="1" name=""/>
+        <p:cNvGrpSpPr/>
+        <p:nvPr/>
+      </p:nvGrpSpPr>
+      <p:grpSpPr>
+        <a:xfrm>
+          <a:off x="0" y="0"/>
+          <a:ext cx="0" cy="0"/>
+          <a:chOff x="0" y="0"/>
+          <a:chExt cx="0" cy="0"/>
+        </a:xfrm>
+      </p:grpSpPr>
+      <p:sp>
+        <p:nvSpPr>
+          <p:cNvPr id="2" name="Title 1">
+            <a:extLst>
+              <a:ext uri="{FF2B5EF4-FFF2-40B4-BE49-F238E27FC236}">
                 <a16:creationId xmlns:a16="http://schemas.microsoft.com/office/drawing/2014/main" id="{9074D7F2-6A76-134B-95EA-51CA24803EBA}"/>
               </a:ext>
             </a:extLst>
@@ -6415,7 +6961,7 @@
             <a:fld id="{05072F42-4DFA-4725-86F9-7594E4AB4EB5}" type="slidenum">
               <a:rPr lang="en-GB" smtClean="0"/>
               <a:pPr/>
-              <a:t>13</a:t>
+              <a:t>16</a:t>
             </a:fld>
             <a:endParaRPr lang="en-GB"/>
           </a:p>
@@ -6434,7 +6980,7 @@
 </p:sld>
 </file>
 
-<file path=ppt/slides/slide14.xml><?xml version="1.0" encoding="utf-8"?>
+<file path=ppt/slides/slide17.xml><?xml version="1.0" encoding="utf-8"?>
 <p:sld xmlns:a="http://schemas.openxmlformats.org/drawingml/2006/main" xmlns:r="http://schemas.openxmlformats.org/officeDocument/2006/relationships" xmlns:p="http://schemas.openxmlformats.org/presentationml/2006/main">
   <p:cSld>
     <p:bg>
@@ -6606,7 +7152,7 @@
                 </a:solidFill>
               </a:rPr>
               <a:pPr algn="l"/>
-              <a:t>14</a:t>
+              <a:t>17</a:t>
             </a:fld>
             <a:endParaRPr lang="en-GB">
               <a:solidFill>
@@ -6659,7 +7205,7 @@
 </p:sld>
 </file>
 
-<file path=ppt/slides/slide15.xml><?xml version="1.0" encoding="utf-8"?>
+<file path=ppt/slides/slide18.xml><?xml version="1.0" encoding="utf-8"?>
 <p:sld xmlns:a="http://schemas.openxmlformats.org/drawingml/2006/main" xmlns:r="http://schemas.openxmlformats.org/officeDocument/2006/relationships" xmlns:p="http://schemas.openxmlformats.org/presentationml/2006/main">
   <p:cSld>
     <p:spTree>
@@ -6823,7 +7369,7 @@
                 </a:solidFill>
               </a:rPr>
               <a:pPr algn="l"/>
-              <a:t>15</a:t>
+              <a:t>18</a:t>
             </a:fld>
             <a:endParaRPr lang="en-GB">
               <a:solidFill>
@@ -6876,7 +7422,7 @@
 </p:sld>
 </file>
 
-<file path=ppt/slides/slide16.xml><?xml version="1.0" encoding="utf-8"?>
+<file path=ppt/slides/slide19.xml><?xml version="1.0" encoding="utf-8"?>
 <p:sld xmlns:a="http://schemas.openxmlformats.org/drawingml/2006/main" xmlns:r="http://schemas.openxmlformats.org/officeDocument/2006/relationships" xmlns:p="http://schemas.openxmlformats.org/presentationml/2006/main">
   <p:cSld>
     <p:spTree>
@@ -7033,7 +7579,7 @@
             <a:fld id="{05072F42-4DFA-4725-86F9-7594E4AB4EB5}" type="slidenum">
               <a:rPr lang="en-GB" smtClean="0"/>
               <a:pPr/>
-              <a:t>16</a:t>
+              <a:t>19</a:t>
             </a:fld>
             <a:endParaRPr lang="en-GB"/>
           </a:p>
@@ -7052,7 +7598,7 @@
 </p:sld>
 </file>
 
-<file path=ppt/slides/slide17.xml><?xml version="1.0" encoding="utf-8"?>
+<file path=ppt/slides/slide2.xml><?xml version="1.0" encoding="utf-8"?>
 <p:sld xmlns:a="http://schemas.openxmlformats.org/drawingml/2006/main" xmlns:r="http://schemas.openxmlformats.org/officeDocument/2006/relationships" xmlns:p="http://schemas.openxmlformats.org/presentationml/2006/main">
   <p:cSld>
     <p:spTree>
@@ -7074,6 +7620,131 @@
           <p:cNvPr id="2" name="Title 1">
             <a:extLst>
               <a:ext uri="{FF2B5EF4-FFF2-40B4-BE49-F238E27FC236}">
+                <a16:creationId xmlns:a16="http://schemas.microsoft.com/office/drawing/2014/main" id="{217D76EF-16F6-0343-93E1-BDA3293D7403}"/>
+              </a:ext>
+            </a:extLst>
+          </p:cNvPr>
+          <p:cNvSpPr>
+            <a:spLocks noGrp="1"/>
+          </p:cNvSpPr>
+          <p:nvPr>
+            <p:ph type="title"/>
+          </p:nvPr>
+        </p:nvSpPr>
+        <p:spPr/>
+        <p:txBody>
+          <a:bodyPr/>
+          <a:lstStyle/>
+          <a:p>
+            <a:r>
+              <a:rPr lang="en-US" dirty="0"/>
+              <a:t>Networking</a:t>
+            </a:r>
+          </a:p>
+        </p:txBody>
+      </p:sp>
+      <p:sp>
+        <p:nvSpPr>
+          <p:cNvPr id="3" name="Content Placeholder 2">
+            <a:extLst>
+              <a:ext uri="{FF2B5EF4-FFF2-40B4-BE49-F238E27FC236}">
+                <a16:creationId xmlns:a16="http://schemas.microsoft.com/office/drawing/2014/main" id="{BB8AF28A-05A6-B241-A132-267BC84021CD}"/>
+              </a:ext>
+            </a:extLst>
+          </p:cNvPr>
+          <p:cNvSpPr>
+            <a:spLocks noGrp="1"/>
+          </p:cNvSpPr>
+          <p:nvPr>
+            <p:ph idx="1"/>
+          </p:nvPr>
+        </p:nvSpPr>
+        <p:spPr/>
+        <p:txBody>
+          <a:bodyPr/>
+          <a:lstStyle/>
+          <a:p>
+            <a:r>
+              <a:rPr lang="en-US" dirty="0"/>
+              <a:t>Creating cloud resources requires some knowledge of networks</a:t>
+            </a:r>
+          </a:p>
+          <a:p>
+            <a:r>
+              <a:rPr lang="en-US" dirty="0"/>
+              <a:t>Major focus is on TCP/IP (UDP not so much) as this is the basis for HTTP(S)/TLS</a:t>
+            </a:r>
+          </a:p>
+          <a:p>
+            <a:r>
+              <a:rPr lang="en-US" dirty="0"/>
+              <a:t>Focus on IPv4 addressing rather than IPv6 as the latter still not significantly supported (in Australia)</a:t>
+            </a:r>
+          </a:p>
+          <a:p>
+            <a:r>
+              <a:rPr lang="en-US" dirty="0"/>
+              <a:t>Need a basic understanding of concepts like:</a:t>
+            </a:r>
+          </a:p>
+          <a:p>
+            <a:pPr lvl="1"/>
+            <a:r>
+              <a:rPr lang="en-US" dirty="0"/>
+              <a:t>Routing</a:t>
+            </a:r>
+          </a:p>
+          <a:p>
+            <a:pPr lvl="1"/>
+            <a:r>
+              <a:rPr lang="en-US" dirty="0"/>
+              <a:t>Private and public networks</a:t>
+            </a:r>
+          </a:p>
+          <a:p>
+            <a:pPr lvl="1"/>
+            <a:r>
+              <a:rPr lang="en-US" dirty="0"/>
+              <a:t>Network latency and throughput</a:t>
+            </a:r>
+          </a:p>
+        </p:txBody>
+      </p:sp>
+    </p:spTree>
+    <p:extLst>
+      <p:ext uri="{BB962C8B-B14F-4D97-AF65-F5344CB8AC3E}">
+        <p14:creationId xmlns:p14="http://schemas.microsoft.com/office/powerpoint/2010/main" val="1550977386"/>
+      </p:ext>
+    </p:extLst>
+  </p:cSld>
+  <p:clrMapOvr>
+    <a:masterClrMapping/>
+  </p:clrMapOvr>
+</p:sld>
+</file>
+
+<file path=ppt/slides/slide20.xml><?xml version="1.0" encoding="utf-8"?>
+<p:sld xmlns:a="http://schemas.openxmlformats.org/drawingml/2006/main" xmlns:r="http://schemas.openxmlformats.org/officeDocument/2006/relationships" xmlns:p="http://schemas.openxmlformats.org/presentationml/2006/main">
+  <p:cSld>
+    <p:spTree>
+      <p:nvGrpSpPr>
+        <p:cNvPr id="1" name=""/>
+        <p:cNvGrpSpPr/>
+        <p:nvPr/>
+      </p:nvGrpSpPr>
+      <p:grpSpPr>
+        <a:xfrm>
+          <a:off x="0" y="0"/>
+          <a:ext cx="0" cy="0"/>
+          <a:chOff x="0" y="0"/>
+          <a:chExt cx="0" cy="0"/>
+        </a:xfrm>
+      </p:grpSpPr>
+      <p:sp>
+        <p:nvSpPr>
+          <p:cNvPr id="2" name="Title 1">
+            <a:extLst>
+              <a:ext uri="{FF2B5EF4-FFF2-40B4-BE49-F238E27FC236}">
                 <a16:creationId xmlns:a16="http://schemas.microsoft.com/office/drawing/2014/main" id="{0A29DDC1-DC08-9C41-B415-AB60C5C7E68E}"/>
               </a:ext>
             </a:extLst>
@@ -7186,7 +7857,7 @@
             <a:fld id="{05072F42-4DFA-4725-86F9-7594E4AB4EB5}" type="slidenum">
               <a:rPr lang="en-GB" smtClean="0"/>
               <a:pPr/>
-              <a:t>17</a:t>
+              <a:t>20</a:t>
             </a:fld>
             <a:endParaRPr lang="en-GB"/>
           </a:p>
@@ -7205,7 +7876,7 @@
 </p:sld>
 </file>
 
-<file path=ppt/slides/slide18.xml><?xml version="1.0" encoding="utf-8"?>
+<file path=ppt/slides/slide21.xml><?xml version="1.0" encoding="utf-8"?>
 <p:sld xmlns:a="http://schemas.openxmlformats.org/drawingml/2006/main" xmlns:r="http://schemas.openxmlformats.org/officeDocument/2006/relationships" xmlns:p="http://schemas.openxmlformats.org/presentationml/2006/main">
   <p:cSld>
     <p:spTree>
@@ -8153,7 +8824,7 @@
 </p:sld>
 </file>
 
-<file path=ppt/slides/slide19.xml><?xml version="1.0" encoding="utf-8"?>
+<file path=ppt/slides/slide22.xml><?xml version="1.0" encoding="utf-8"?>
 <p:sld xmlns:a="http://schemas.openxmlformats.org/drawingml/2006/main" xmlns:r="http://schemas.openxmlformats.org/officeDocument/2006/relationships" xmlns:p="http://schemas.openxmlformats.org/presentationml/2006/main">
   <p:cSld>
     <p:bg>
@@ -8500,7 +9171,7 @@
 </p:sld>
 </file>
 
-<file path=ppt/slides/slide2.xml><?xml version="1.0" encoding="utf-8"?>
+<file path=ppt/slides/slide23.xml><?xml version="1.0" encoding="utf-8"?>
 <p:sld xmlns:a="http://schemas.openxmlformats.org/drawingml/2006/main" xmlns:r="http://schemas.openxmlformats.org/officeDocument/2006/relationships" xmlns:p="http://schemas.openxmlformats.org/presentationml/2006/main">
   <p:cSld>
     <p:spTree>
@@ -8522,131 +9193,6 @@
           <p:cNvPr id="2" name="Title 1">
             <a:extLst>
               <a:ext uri="{FF2B5EF4-FFF2-40B4-BE49-F238E27FC236}">
-                <a16:creationId xmlns:a16="http://schemas.microsoft.com/office/drawing/2014/main" id="{217D76EF-16F6-0343-93E1-BDA3293D7403}"/>
-              </a:ext>
-            </a:extLst>
-          </p:cNvPr>
-          <p:cNvSpPr>
-            <a:spLocks noGrp="1"/>
-          </p:cNvSpPr>
-          <p:nvPr>
-            <p:ph type="title"/>
-          </p:nvPr>
-        </p:nvSpPr>
-        <p:spPr/>
-        <p:txBody>
-          <a:bodyPr/>
-          <a:lstStyle/>
-          <a:p>
-            <a:r>
-              <a:rPr lang="en-US" dirty="0"/>
-              <a:t>Networking</a:t>
-            </a:r>
-          </a:p>
-        </p:txBody>
-      </p:sp>
-      <p:sp>
-        <p:nvSpPr>
-          <p:cNvPr id="3" name="Content Placeholder 2">
-            <a:extLst>
-              <a:ext uri="{FF2B5EF4-FFF2-40B4-BE49-F238E27FC236}">
-                <a16:creationId xmlns:a16="http://schemas.microsoft.com/office/drawing/2014/main" id="{BB8AF28A-05A6-B241-A132-267BC84021CD}"/>
-              </a:ext>
-            </a:extLst>
-          </p:cNvPr>
-          <p:cNvSpPr>
-            <a:spLocks noGrp="1"/>
-          </p:cNvSpPr>
-          <p:nvPr>
-            <p:ph idx="1"/>
-          </p:nvPr>
-        </p:nvSpPr>
-        <p:spPr/>
-        <p:txBody>
-          <a:bodyPr/>
-          <a:lstStyle/>
-          <a:p>
-            <a:r>
-              <a:rPr lang="en-US" dirty="0"/>
-              <a:t>Creating cloud resources requires some knowledge of networks</a:t>
-            </a:r>
-          </a:p>
-          <a:p>
-            <a:r>
-              <a:rPr lang="en-US" dirty="0"/>
-              <a:t>Major focus is on TCP/IP (UDP not so much) as this is the basis for HTTP(S)/TLS</a:t>
-            </a:r>
-          </a:p>
-          <a:p>
-            <a:r>
-              <a:rPr lang="en-US" dirty="0"/>
-              <a:t>Focus on IPv4 addressing rather than IPv6 as the latter still not significantly supported (in Australia)</a:t>
-            </a:r>
-          </a:p>
-          <a:p>
-            <a:r>
-              <a:rPr lang="en-US" dirty="0"/>
-              <a:t>Need a basic understanding of concepts like:</a:t>
-            </a:r>
-          </a:p>
-          <a:p>
-            <a:pPr lvl="1"/>
-            <a:r>
-              <a:rPr lang="en-US" dirty="0"/>
-              <a:t>Routing</a:t>
-            </a:r>
-          </a:p>
-          <a:p>
-            <a:pPr lvl="1"/>
-            <a:r>
-              <a:rPr lang="en-US" dirty="0"/>
-              <a:t>Private and public networks</a:t>
-            </a:r>
-          </a:p>
-          <a:p>
-            <a:pPr lvl="1"/>
-            <a:r>
-              <a:rPr lang="en-US" dirty="0"/>
-              <a:t>Network latency and throughput</a:t>
-            </a:r>
-          </a:p>
-        </p:txBody>
-      </p:sp>
-    </p:spTree>
-    <p:extLst>
-      <p:ext uri="{BB962C8B-B14F-4D97-AF65-F5344CB8AC3E}">
-        <p14:creationId xmlns:p14="http://schemas.microsoft.com/office/powerpoint/2010/main" val="1550977386"/>
-      </p:ext>
-    </p:extLst>
-  </p:cSld>
-  <p:clrMapOvr>
-    <a:masterClrMapping/>
-  </p:clrMapOvr>
-</p:sld>
-</file>
-
-<file path=ppt/slides/slide20.xml><?xml version="1.0" encoding="utf-8"?>
-<p:sld xmlns:a="http://schemas.openxmlformats.org/drawingml/2006/main" xmlns:r="http://schemas.openxmlformats.org/officeDocument/2006/relationships" xmlns:p="http://schemas.openxmlformats.org/presentationml/2006/main">
-  <p:cSld>
-    <p:spTree>
-      <p:nvGrpSpPr>
-        <p:cNvPr id="1" name=""/>
-        <p:cNvGrpSpPr/>
-        <p:nvPr/>
-      </p:nvGrpSpPr>
-      <p:grpSpPr>
-        <a:xfrm>
-          <a:off x="0" y="0"/>
-          <a:ext cx="0" cy="0"/>
-          <a:chOff x="0" y="0"/>
-          <a:chExt cx="0" cy="0"/>
-        </a:xfrm>
-      </p:grpSpPr>
-      <p:sp>
-        <p:nvSpPr>
-          <p:cNvPr id="2" name="Title 1">
-            <a:extLst>
-              <a:ext uri="{FF2B5EF4-FFF2-40B4-BE49-F238E27FC236}">
                 <a16:creationId xmlns:a16="http://schemas.microsoft.com/office/drawing/2014/main" id="{322E663B-AE88-4642-89CD-5F0CCCAC6E0B}"/>
               </a:ext>
             </a:extLst>
@@ -8785,7 +9331,7 @@
             <a:fld id="{05072F42-4DFA-4725-86F9-7594E4AB4EB5}" type="slidenum">
               <a:rPr lang="en-GB" smtClean="0"/>
               <a:pPr/>
-              <a:t>20</a:t>
+              <a:t>23</a:t>
             </a:fld>
             <a:endParaRPr lang="en-GB"/>
           </a:p>
@@ -8804,7 +9350,7 @@
 </p:sld>
 </file>
 
-<file path=ppt/slides/slide21.xml><?xml version="1.0" encoding="utf-8"?>
+<file path=ppt/slides/slide24.xml><?xml version="1.0" encoding="utf-8"?>
 <p:sld xmlns:a="http://schemas.openxmlformats.org/drawingml/2006/main" xmlns:r="http://schemas.openxmlformats.org/officeDocument/2006/relationships" xmlns:p="http://schemas.openxmlformats.org/presentationml/2006/main">
   <p:cSld>
     <p:bg>

</xml_diff>